<commit_message>
Updated PPT 8-12 10pm
</commit_message>
<xml_diff>
--- a/Project 1 Presentation Templatebg.pptx
+++ b/Project 1 Presentation Templatebg.pptx
@@ -5,7 +5,7 @@
     <p:sldMasterId id="2147483689" r:id="rId1"/>
   </p:sldMasterIdLst>
   <p:notesMasterIdLst>
-    <p:notesMasterId r:id="rId10"/>
+    <p:notesMasterId r:id="rId13"/>
   </p:notesMasterIdLst>
   <p:sldIdLst>
     <p:sldId id="256" r:id="rId2"/>
@@ -13,9 +13,12 @@
     <p:sldId id="258" r:id="rId4"/>
     <p:sldId id="259" r:id="rId5"/>
     <p:sldId id="260" r:id="rId6"/>
-    <p:sldId id="261" r:id="rId7"/>
-    <p:sldId id="262" r:id="rId8"/>
-    <p:sldId id="263" r:id="rId9"/>
+    <p:sldId id="264" r:id="rId7"/>
+    <p:sldId id="265" r:id="rId8"/>
+    <p:sldId id="266" r:id="rId9"/>
+    <p:sldId id="261" r:id="rId10"/>
+    <p:sldId id="262" r:id="rId11"/>
+    <p:sldId id="263" r:id="rId12"/>
   </p:sldIdLst>
   <p:sldSz cx="12192000" cy="6858000"/>
   <p:notesSz cx="6858000" cy="9144000"/>
@@ -122,6 +125,18 @@
 </p:presentation>
 </file>
 
+<file path=ppt/commentAuthors.xml><?xml version="1.0" encoding="utf-8"?>
+<p:cmAuthorLst xmlns:a="http://schemas.openxmlformats.org/drawingml/2006/main" xmlns:r="http://schemas.openxmlformats.org/officeDocument/2006/relationships" xmlns:p="http://schemas.openxmlformats.org/presentationml/2006/main">
+  <p:cmAuthor id="1" name="HicoPC" initials="H" lastIdx="1" clrIdx="0">
+    <p:extLst>
+      <p:ext uri="{19B8F6BF-5375-455C-9EA6-DF929625EA0E}">
+        <p15:presenceInfo xmlns:p15="http://schemas.microsoft.com/office/powerpoint/2012/main" userId="HicoPC" providerId="None"/>
+      </p:ext>
+    </p:extLst>
+  </p:cmAuthor>
+</p:cmAuthorLst>
+</file>
+
 <file path=ppt/notesMasters/notesMaster1.xml><?xml version="1.0" encoding="utf-8"?>
 <p:notesMaster xmlns:a="http://schemas.openxmlformats.org/drawingml/2006/main" xmlns:r="http://schemas.openxmlformats.org/officeDocument/2006/relationships" xmlns:p="http://schemas.openxmlformats.org/presentationml/2006/main">
   <p:cSld>
@@ -204,7 +219,7 @@
           <a:p>
             <a:fld id="{F6F9B6C9-9DF1-4394-BC16-4F555A4B3822}" type="datetimeFigureOut">
               <a:rPr lang="en-US" smtClean="0"/>
-              <a:t>8/11/2018</a:t>
+              <a:t>8/12/2018</a:t>
             </a:fld>
             <a:endParaRPr lang="en-US"/>
           </a:p>
@@ -781,7 +796,7 @@
           <a:p>
             <a:fld id="{1E1E479D-5F8C-4919-ACB4-332E378273DA}" type="datetimeFigureOut">
               <a:rPr lang="en-US" smtClean="0"/>
-              <a:t>8/11/2018</a:t>
+              <a:t>8/12/2018</a:t>
             </a:fld>
             <a:endParaRPr lang="en-US"/>
           </a:p>
@@ -989,7 +1004,7 @@
           <a:p>
             <a:fld id="{1E1E479D-5F8C-4919-ACB4-332E378273DA}" type="datetimeFigureOut">
               <a:rPr lang="en-US" smtClean="0"/>
-              <a:t>8/11/2018</a:t>
+              <a:t>8/12/2018</a:t>
             </a:fld>
             <a:endParaRPr lang="en-US"/>
           </a:p>
@@ -1245,7 +1260,7 @@
           <a:p>
             <a:fld id="{1E1E479D-5F8C-4919-ACB4-332E378273DA}" type="datetimeFigureOut">
               <a:rPr lang="en-US" smtClean="0"/>
-              <a:t>8/11/2018</a:t>
+              <a:t>8/12/2018</a:t>
             </a:fld>
             <a:endParaRPr lang="en-US"/>
           </a:p>
@@ -1419,7 +1434,7 @@
           <a:p>
             <a:fld id="{1E1E479D-5F8C-4919-ACB4-332E378273DA}" type="datetimeFigureOut">
               <a:rPr lang="en-US" smtClean="0"/>
-              <a:t>8/11/2018</a:t>
+              <a:t>8/12/2018</a:t>
             </a:fld>
             <a:endParaRPr lang="en-US"/>
           </a:p>
@@ -1762,7 +1777,7 @@
           <a:p>
             <a:fld id="{1E1E479D-5F8C-4919-ACB4-332E378273DA}" type="datetimeFigureOut">
               <a:rPr lang="en-US" smtClean="0"/>
-              <a:t>8/11/2018</a:t>
+              <a:t>8/12/2018</a:t>
             </a:fld>
             <a:endParaRPr lang="en-US"/>
           </a:p>
@@ -2037,7 +2052,7 @@
           <a:p>
             <a:fld id="{1E1E479D-5F8C-4919-ACB4-332E378273DA}" type="datetimeFigureOut">
               <a:rPr lang="en-US" smtClean="0"/>
-              <a:t>8/11/2018</a:t>
+              <a:t>8/12/2018</a:t>
             </a:fld>
             <a:endParaRPr lang="en-US"/>
           </a:p>
@@ -2416,7 +2431,7 @@
           <a:p>
             <a:fld id="{1E1E479D-5F8C-4919-ACB4-332E378273DA}" type="datetimeFigureOut">
               <a:rPr lang="en-US" smtClean="0"/>
-              <a:t>8/11/2018</a:t>
+              <a:t>8/12/2018</a:t>
             </a:fld>
             <a:endParaRPr lang="en-US"/>
           </a:p>
@@ -2534,7 +2549,7 @@
           <a:p>
             <a:fld id="{1E1E479D-5F8C-4919-ACB4-332E378273DA}" type="datetimeFigureOut">
               <a:rPr lang="en-US" smtClean="0"/>
-              <a:t>8/11/2018</a:t>
+              <a:t>8/12/2018</a:t>
             </a:fld>
             <a:endParaRPr lang="en-US"/>
           </a:p>
@@ -2705,7 +2720,7 @@
           <a:p>
             <a:fld id="{1E1E479D-5F8C-4919-ACB4-332E378273DA}" type="datetimeFigureOut">
               <a:rPr lang="en-US" smtClean="0"/>
-              <a:t>8/11/2018</a:t>
+              <a:t>8/12/2018</a:t>
             </a:fld>
             <a:endParaRPr lang="en-US"/>
           </a:p>
@@ -3059,7 +3074,7 @@
           <a:p>
             <a:fld id="{1E1E479D-5F8C-4919-ACB4-332E378273DA}" type="datetimeFigureOut">
               <a:rPr lang="en-US" smtClean="0"/>
-              <a:t>8/11/2018</a:t>
+              <a:t>8/12/2018</a:t>
             </a:fld>
             <a:endParaRPr lang="en-US"/>
           </a:p>
@@ -3441,7 +3456,7 @@
           <a:p>
             <a:fld id="{1E1E479D-5F8C-4919-ACB4-332E378273DA}" type="datetimeFigureOut">
               <a:rPr lang="en-US" smtClean="0"/>
-              <a:t>8/11/2018</a:t>
+              <a:t>8/12/2018</a:t>
             </a:fld>
             <a:endParaRPr lang="en-US"/>
           </a:p>
@@ -3728,7 +3743,7 @@
           <a:p>
             <a:fld id="{1E1E479D-5F8C-4919-ACB4-332E378273DA}" type="datetimeFigureOut">
               <a:rPr lang="en-US" smtClean="0"/>
-              <a:t>8/11/2018</a:t>
+              <a:t>8/12/2018</a:t>
             </a:fld>
             <a:endParaRPr lang="en-US"/>
           </a:p>
@@ -4326,6 +4341,202 @@
 </p:sld>
 </file>
 
+<file path=ppt/slides/slide10.xml><?xml version="1.0" encoding="utf-8"?>
+<p:sld xmlns:a="http://schemas.openxmlformats.org/drawingml/2006/main" xmlns:r="http://schemas.openxmlformats.org/officeDocument/2006/relationships" xmlns:p="http://schemas.openxmlformats.org/presentationml/2006/main">
+  <p:cSld>
+    <p:spTree>
+      <p:nvGrpSpPr>
+        <p:cNvPr id="1" name=""/>
+        <p:cNvGrpSpPr/>
+        <p:nvPr/>
+      </p:nvGrpSpPr>
+      <p:grpSpPr>
+        <a:xfrm>
+          <a:off x="0" y="0"/>
+          <a:ext cx="0" cy="0"/>
+          <a:chOff x="0" y="0"/>
+          <a:chExt cx="0" cy="0"/>
+        </a:xfrm>
+      </p:grpSpPr>
+      <p:sp>
+        <p:nvSpPr>
+          <p:cNvPr id="2" name="Title 1">
+            <a:extLst>
+              <a:ext uri="{FF2B5EF4-FFF2-40B4-BE49-F238E27FC236}">
+                <a16:creationId xmlns:a16="http://schemas.microsoft.com/office/drawing/2014/main" id="{0585AFDD-15A8-49BD-A991-AC342AB3A002}"/>
+              </a:ext>
+            </a:extLst>
+          </p:cNvPr>
+          <p:cNvSpPr>
+            <a:spLocks noGrp="1"/>
+          </p:cNvSpPr>
+          <p:nvPr>
+            <p:ph type="title"/>
+          </p:nvPr>
+        </p:nvSpPr>
+        <p:spPr/>
+        <p:txBody>
+          <a:bodyPr/>
+          <a:lstStyle/>
+          <a:p>
+            <a:r>
+              <a:rPr lang="en-US" dirty="0"/>
+              <a:t>Post Mortem</a:t>
+            </a:r>
+          </a:p>
+        </p:txBody>
+      </p:sp>
+      <p:sp>
+        <p:nvSpPr>
+          <p:cNvPr id="3" name="Content Placeholder 2">
+            <a:extLst>
+              <a:ext uri="{FF2B5EF4-FFF2-40B4-BE49-F238E27FC236}">
+                <a16:creationId xmlns:a16="http://schemas.microsoft.com/office/drawing/2014/main" id="{30C4F1C1-804B-4A2E-836E-DCB09E48F49D}"/>
+              </a:ext>
+            </a:extLst>
+          </p:cNvPr>
+          <p:cNvSpPr>
+            <a:spLocks noGrp="1"/>
+          </p:cNvSpPr>
+          <p:nvPr>
+            <p:ph idx="1"/>
+          </p:nvPr>
+        </p:nvSpPr>
+        <p:spPr/>
+        <p:txBody>
+          <a:bodyPr/>
+          <a:lstStyle/>
+          <a:p>
+            <a:br>
+              <a:rPr lang="en-US" dirty="0"/>
+            </a:br>
+            <a:r>
+              <a:rPr lang="en-US" dirty="0"/>
+              <a:t>  * Discuss any difficulties that arose, and how you dealt with them</a:t>
+            </a:r>
+            <a:br>
+              <a:rPr lang="en-US" dirty="0"/>
+            </a:br>
+            <a:r>
+              <a:rPr lang="en-US" dirty="0"/>
+              <a:t>  * Discuss any additional questions that came up, but which you didn't have time to answer: What would you research next, if you had two more weeks?</a:t>
+            </a:r>
+            <a:br>
+              <a:rPr lang="en-US" dirty="0"/>
+            </a:br>
+            <a:endParaRPr lang="en-US" dirty="0"/>
+          </a:p>
+          <a:p>
+            <a:endParaRPr lang="en-US" dirty="0"/>
+          </a:p>
+        </p:txBody>
+      </p:sp>
+    </p:spTree>
+    <p:extLst>
+      <p:ext uri="{BB962C8B-B14F-4D97-AF65-F5344CB8AC3E}">
+        <p14:creationId xmlns:p14="http://schemas.microsoft.com/office/powerpoint/2010/main" val="2452138939"/>
+      </p:ext>
+    </p:extLst>
+  </p:cSld>
+  <p:clrMapOvr>
+    <a:masterClrMapping/>
+  </p:clrMapOvr>
+</p:sld>
+</file>
+
+<file path=ppt/slides/slide11.xml><?xml version="1.0" encoding="utf-8"?>
+<p:sld xmlns:a="http://schemas.openxmlformats.org/drawingml/2006/main" xmlns:r="http://schemas.openxmlformats.org/officeDocument/2006/relationships" xmlns:p="http://schemas.openxmlformats.org/presentationml/2006/main">
+  <p:cSld>
+    <p:spTree>
+      <p:nvGrpSpPr>
+        <p:cNvPr id="1" name=""/>
+        <p:cNvGrpSpPr/>
+        <p:nvPr/>
+      </p:nvGrpSpPr>
+      <p:grpSpPr>
+        <a:xfrm>
+          <a:off x="0" y="0"/>
+          <a:ext cx="0" cy="0"/>
+          <a:chOff x="0" y="0"/>
+          <a:chExt cx="0" cy="0"/>
+        </a:xfrm>
+      </p:grpSpPr>
+      <p:sp>
+        <p:nvSpPr>
+          <p:cNvPr id="2" name="Title 1">
+            <a:extLst>
+              <a:ext uri="{FF2B5EF4-FFF2-40B4-BE49-F238E27FC236}">
+                <a16:creationId xmlns:a16="http://schemas.microsoft.com/office/drawing/2014/main" id="{0585AFDD-15A8-49BD-A991-AC342AB3A002}"/>
+              </a:ext>
+            </a:extLst>
+          </p:cNvPr>
+          <p:cNvSpPr>
+            <a:spLocks noGrp="1"/>
+          </p:cNvSpPr>
+          <p:nvPr>
+            <p:ph type="title"/>
+          </p:nvPr>
+        </p:nvSpPr>
+        <p:spPr/>
+        <p:txBody>
+          <a:bodyPr/>
+          <a:lstStyle/>
+          <a:p>
+            <a:r>
+              <a:rPr lang="en-US" dirty="0"/>
+              <a:t>Questions</a:t>
+            </a:r>
+          </a:p>
+        </p:txBody>
+      </p:sp>
+      <p:sp>
+        <p:nvSpPr>
+          <p:cNvPr id="3" name="Content Placeholder 2">
+            <a:extLst>
+              <a:ext uri="{FF2B5EF4-FFF2-40B4-BE49-F238E27FC236}">
+                <a16:creationId xmlns:a16="http://schemas.microsoft.com/office/drawing/2014/main" id="{30C4F1C1-804B-4A2E-836E-DCB09E48F49D}"/>
+              </a:ext>
+            </a:extLst>
+          </p:cNvPr>
+          <p:cNvSpPr>
+            <a:spLocks noGrp="1"/>
+          </p:cNvSpPr>
+          <p:nvPr>
+            <p:ph idx="1"/>
+          </p:nvPr>
+        </p:nvSpPr>
+        <p:spPr/>
+        <p:txBody>
+          <a:bodyPr/>
+          <a:lstStyle/>
+          <a:p>
+            <a:r>
+              <a:rPr lang="en-US" dirty="0"/>
+              <a:t>  * Open-floor Q&amp;A with the audience</a:t>
+            </a:r>
+            <a:br>
+              <a:rPr lang="en-US" dirty="0"/>
+            </a:br>
+            <a:endParaRPr lang="en-US" dirty="0"/>
+          </a:p>
+          <a:p>
+            <a:endParaRPr lang="en-US" dirty="0"/>
+          </a:p>
+        </p:txBody>
+      </p:sp>
+    </p:spTree>
+    <p:extLst>
+      <p:ext uri="{BB962C8B-B14F-4D97-AF65-F5344CB8AC3E}">
+        <p14:creationId xmlns:p14="http://schemas.microsoft.com/office/powerpoint/2010/main" val="3314395609"/>
+      </p:ext>
+    </p:extLst>
+  </p:cSld>
+  <p:clrMapOvr>
+    <a:masterClrMapping/>
+  </p:clrMapOvr>
+</p:sld>
+</file>
+
 <file path=ppt/slides/slide2.xml><?xml version="1.0" encoding="utf-8"?>
 <p:sld xmlns:a="http://schemas.openxmlformats.org/drawingml/2006/main" xmlns:r="http://schemas.openxmlformats.org/officeDocument/2006/relationships" xmlns:p="http://schemas.openxmlformats.org/presentationml/2006/main">
   <p:cSld>
@@ -4682,6 +4893,64 @@
           </a:p>
         </p:txBody>
       </p:sp>
+      <p:pic>
+        <p:nvPicPr>
+          <p:cNvPr id="4" name="Picture 3">
+            <a:extLst>
+              <a:ext uri="{FF2B5EF4-FFF2-40B4-BE49-F238E27FC236}">
+                <a16:creationId xmlns:a16="http://schemas.microsoft.com/office/drawing/2014/main" id="{BFB8D683-71FC-4406-9162-5D8D14F149C5}"/>
+              </a:ext>
+            </a:extLst>
+          </p:cNvPr>
+          <p:cNvPicPr>
+            <a:picLocks noChangeAspect="1"/>
+          </p:cNvPicPr>
+          <p:nvPr/>
+        </p:nvPicPr>
+        <p:blipFill rotWithShape="1">
+          <a:blip r:embed="rId4"/>
+          <a:srcRect l="8500" t="8869" r="59500" b="84017"/>
+          <a:stretch/>
+        </p:blipFill>
+        <p:spPr>
+          <a:xfrm>
+            <a:off x="6096000" y="4068417"/>
+            <a:ext cx="3901440" cy="487680"/>
+          </a:xfrm>
+          <a:prstGeom prst="rect">
+            <a:avLst/>
+          </a:prstGeom>
+        </p:spPr>
+      </p:pic>
+      <p:pic>
+        <p:nvPicPr>
+          <p:cNvPr id="5" name="Picture 4">
+            <a:extLst>
+              <a:ext uri="{FF2B5EF4-FFF2-40B4-BE49-F238E27FC236}">
+                <a16:creationId xmlns:a16="http://schemas.microsoft.com/office/drawing/2014/main" id="{5D9DF483-110F-4039-9778-9A6575CBAC98}"/>
+              </a:ext>
+            </a:extLst>
+          </p:cNvPr>
+          <p:cNvPicPr>
+            <a:picLocks noChangeAspect="1"/>
+          </p:cNvPicPr>
+          <p:nvPr/>
+        </p:nvPicPr>
+        <p:blipFill rotWithShape="1">
+          <a:blip r:embed="rId5"/>
+          <a:srcRect l="7174" t="10416" r="53614" b="81759"/>
+          <a:stretch/>
+        </p:blipFill>
+        <p:spPr>
+          <a:xfrm>
+            <a:off x="6096000" y="4676186"/>
+            <a:ext cx="4780569" cy="536409"/>
+          </a:xfrm>
+          <a:prstGeom prst="rect">
+            <a:avLst/>
+          </a:prstGeom>
+        </p:spPr>
+      </p:pic>
     </p:spTree>
     <p:extLst>
       <p:ext uri="{BB962C8B-B14F-4D97-AF65-F5344CB8AC3E}">
@@ -4852,7 +5121,7 @@
             </a:pPr>
             <a:r>
               <a:rPr lang="en-CA" dirty="0"/>
-              <a:t> Removed rows with missing data</a:t>
+              <a:t>  Removed extraneous columns</a:t>
             </a:r>
           </a:p>
           <a:p>
@@ -4862,7 +5131,7 @@
             </a:pPr>
             <a:r>
               <a:rPr lang="en-CA" dirty="0"/>
-              <a:t>Removed extraneous columns</a:t>
+              <a:t>  Removed rows with missing data</a:t>
             </a:r>
           </a:p>
           <a:p>
@@ -4881,11 +5150,7 @@
             </a:pPr>
             <a:r>
               <a:rPr lang="en-US" dirty="0"/>
-              <a:t> Many holes in the </a:t>
-            </a:r>
-            <a:r>
-              <a:rPr lang="en-US"/>
-              <a:t>completion data</a:t>
+              <a:t> Many holes in the completion data</a:t>
             </a:r>
             <a:br>
               <a:rPr lang="en-US" dirty="0"/>
@@ -4897,6 +5162,64 @@
           </a:p>
         </p:txBody>
       </p:sp>
+      <p:pic>
+        <p:nvPicPr>
+          <p:cNvPr id="4" name="Picture 3">
+            <a:extLst>
+              <a:ext uri="{FF2B5EF4-FFF2-40B4-BE49-F238E27FC236}">
+                <a16:creationId xmlns:a16="http://schemas.microsoft.com/office/drawing/2014/main" id="{0E93D6B7-D3C0-4BFE-BDBD-19401CA1C63D}"/>
+              </a:ext>
+            </a:extLst>
+          </p:cNvPr>
+          <p:cNvPicPr>
+            <a:picLocks noChangeAspect="1"/>
+          </p:cNvPicPr>
+          <p:nvPr/>
+        </p:nvPicPr>
+        <p:blipFill rotWithShape="1">
+          <a:blip r:embed="rId3"/>
+          <a:srcRect l="53663" t="60160" r="3198" b="7576"/>
+          <a:stretch/>
+        </p:blipFill>
+        <p:spPr>
+          <a:xfrm>
+            <a:off x="6698512" y="1845734"/>
+            <a:ext cx="5259572" cy="2211572"/>
+          </a:xfrm>
+          <a:prstGeom prst="rect">
+            <a:avLst/>
+          </a:prstGeom>
+        </p:spPr>
+      </p:pic>
+      <p:pic>
+        <p:nvPicPr>
+          <p:cNvPr id="5" name="Picture 4">
+            <a:extLst>
+              <a:ext uri="{FF2B5EF4-FFF2-40B4-BE49-F238E27FC236}">
+                <a16:creationId xmlns:a16="http://schemas.microsoft.com/office/drawing/2014/main" id="{1E54A1FE-1032-4314-AABF-7BB3F47C7A36}"/>
+              </a:ext>
+            </a:extLst>
+          </p:cNvPr>
+          <p:cNvPicPr>
+            <a:picLocks noChangeAspect="1"/>
+          </p:cNvPicPr>
+          <p:nvPr/>
+        </p:nvPicPr>
+        <p:blipFill rotWithShape="1">
+          <a:blip r:embed="rId4"/>
+          <a:srcRect l="48463" t="15818" r="8398" b="64452"/>
+          <a:stretch/>
+        </p:blipFill>
+        <p:spPr>
+          <a:xfrm>
+            <a:off x="6698512" y="4286970"/>
+            <a:ext cx="5259572" cy="1352459"/>
+          </a:xfrm>
+          <a:prstGeom prst="rect">
+            <a:avLst/>
+          </a:prstGeom>
+        </p:spPr>
+      </p:pic>
     </p:spTree>
     <p:extLst>
       <p:ext uri="{BB962C8B-B14F-4D97-AF65-F5344CB8AC3E}">
@@ -5050,73 +5373,118 @@
           <a:chExt cx="0" cy="0"/>
         </a:xfrm>
       </p:grpSpPr>
-      <p:sp>
-        <p:nvSpPr>
-          <p:cNvPr id="2" name="Title 1">
+      <p:pic>
+        <p:nvPicPr>
+          <p:cNvPr id="3" name="Picture 2">
             <a:extLst>
               <a:ext uri="{FF2B5EF4-FFF2-40B4-BE49-F238E27FC236}">
-                <a16:creationId xmlns:a16="http://schemas.microsoft.com/office/drawing/2014/main" id="{0585AFDD-15A8-49BD-A991-AC342AB3A002}"/>
+                <a16:creationId xmlns:a16="http://schemas.microsoft.com/office/drawing/2014/main" id="{47C9C1F8-0E05-4ED2-BF3F-4DAEE444977B}"/>
               </a:ext>
             </a:extLst>
           </p:cNvPr>
-          <p:cNvSpPr>
-            <a:spLocks noGrp="1"/>
-          </p:cNvSpPr>
-          <p:nvPr>
-            <p:ph type="title"/>
-          </p:nvPr>
-        </p:nvSpPr>
-        <p:spPr/>
-        <p:txBody>
-          <a:bodyPr/>
-          <a:lstStyle/>
-          <a:p>
-            <a:r>
-              <a:rPr lang="en-US" dirty="0"/>
-              <a:t>Discussion</a:t>
-            </a:r>
-          </a:p>
-        </p:txBody>
-      </p:sp>
-      <p:sp>
-        <p:nvSpPr>
-          <p:cNvPr id="3" name="Content Placeholder 2">
+          <p:cNvPicPr>
+            <a:picLocks noChangeAspect="1"/>
+          </p:cNvPicPr>
+          <p:nvPr/>
+        </p:nvPicPr>
+        <p:blipFill>
+          <a:blip r:embed="rId2">
+            <a:extLst>
+              <a:ext uri="{28A0092B-C50C-407E-A947-70E740481C1C}">
+                <a14:useLocalDpi xmlns:a14="http://schemas.microsoft.com/office/drawing/2010/main" val="0"/>
+              </a:ext>
+            </a:extLst>
+          </a:blip>
+          <a:stretch>
+            <a:fillRect/>
+          </a:stretch>
+        </p:blipFill>
+        <p:spPr>
+          <a:xfrm>
+            <a:off x="6545540" y="0"/>
+            <a:ext cx="5487650" cy="3658433"/>
+          </a:xfrm>
+          <a:prstGeom prst="rect">
+            <a:avLst/>
+          </a:prstGeom>
+        </p:spPr>
+      </p:pic>
+      <p:pic>
+        <p:nvPicPr>
+          <p:cNvPr id="11" name="Picture 10">
             <a:extLst>
               <a:ext uri="{FF2B5EF4-FFF2-40B4-BE49-F238E27FC236}">
-                <a16:creationId xmlns:a16="http://schemas.microsoft.com/office/drawing/2014/main" id="{30C4F1C1-804B-4A2E-836E-DCB09E48F49D}"/>
+                <a16:creationId xmlns:a16="http://schemas.microsoft.com/office/drawing/2014/main" id="{F32AAAB6-053C-4635-8192-BE43E372860F}"/>
               </a:ext>
             </a:extLst>
           </p:cNvPr>
-          <p:cNvSpPr>
-            <a:spLocks noGrp="1"/>
-          </p:cNvSpPr>
-          <p:nvPr>
-            <p:ph idx="1"/>
-          </p:nvPr>
-        </p:nvSpPr>
-        <p:spPr/>
-        <p:txBody>
-          <a:bodyPr/>
-          <a:lstStyle/>
-          <a:p>
-            <a:r>
-              <a:rPr lang="en-US" dirty="0"/>
-              <a:t>  * Discuss your findings. Did you find what you expected to find? If not, why not? What inferences or general conclusions can you draw from your analysis?</a:t>
-            </a:r>
-            <a:br>
-              <a:rPr lang="en-US" dirty="0"/>
-            </a:br>
-            <a:endParaRPr lang="en-US" dirty="0"/>
-          </a:p>
-          <a:p>
-            <a:endParaRPr lang="en-US" dirty="0"/>
-          </a:p>
-        </p:txBody>
-      </p:sp>
+          <p:cNvPicPr>
+            <a:picLocks noChangeAspect="1"/>
+          </p:cNvPicPr>
+          <p:nvPr/>
+        </p:nvPicPr>
+        <p:blipFill>
+          <a:blip r:embed="rId3">
+            <a:extLst>
+              <a:ext uri="{28A0092B-C50C-407E-A947-70E740481C1C}">
+                <a14:useLocalDpi xmlns:a14="http://schemas.microsoft.com/office/drawing/2010/main" val="0"/>
+              </a:ext>
+            </a:extLst>
+          </a:blip>
+          <a:stretch>
+            <a:fillRect/>
+          </a:stretch>
+        </p:blipFill>
+        <p:spPr>
+          <a:xfrm>
+            <a:off x="0" y="0"/>
+            <a:ext cx="5487650" cy="3658433"/>
+          </a:xfrm>
+          <a:prstGeom prst="rect">
+            <a:avLst/>
+          </a:prstGeom>
+        </p:spPr>
+      </p:pic>
+      <p:pic>
+        <p:nvPicPr>
+          <p:cNvPr id="18" name="Picture 17">
+            <a:extLst>
+              <a:ext uri="{FF2B5EF4-FFF2-40B4-BE49-F238E27FC236}">
+                <a16:creationId xmlns:a16="http://schemas.microsoft.com/office/drawing/2014/main" id="{FFB9865B-D38E-4243-A2AE-F62A13CDF44C}"/>
+              </a:ext>
+            </a:extLst>
+          </p:cNvPr>
+          <p:cNvPicPr>
+            <a:picLocks noChangeAspect="1"/>
+          </p:cNvPicPr>
+          <p:nvPr/>
+        </p:nvPicPr>
+        <p:blipFill>
+          <a:blip r:embed="rId4">
+            <a:extLst>
+              <a:ext uri="{28A0092B-C50C-407E-A947-70E740481C1C}">
+                <a14:useLocalDpi xmlns:a14="http://schemas.microsoft.com/office/drawing/2010/main" val="0"/>
+              </a:ext>
+            </a:extLst>
+          </a:blip>
+          <a:stretch>
+            <a:fillRect/>
+          </a:stretch>
+        </p:blipFill>
+        <p:spPr>
+          <a:xfrm>
+            <a:off x="3352175" y="3484464"/>
+            <a:ext cx="5060305" cy="3373536"/>
+          </a:xfrm>
+          <a:prstGeom prst="rect">
+            <a:avLst/>
+          </a:prstGeom>
+        </p:spPr>
+      </p:pic>
     </p:spTree>
     <p:extLst>
       <p:ext uri="{BB962C8B-B14F-4D97-AF65-F5344CB8AC3E}">
-        <p14:creationId xmlns:p14="http://schemas.microsoft.com/office/powerpoint/2010/main" val="1047368940"/>
+        <p14:creationId xmlns:p14="http://schemas.microsoft.com/office/powerpoint/2010/main" val="3404983984"/>
       </p:ext>
     </p:extLst>
   </p:cSld>
@@ -5143,83 +5511,118 @@
           <a:chExt cx="0" cy="0"/>
         </a:xfrm>
       </p:grpSpPr>
-      <p:sp>
-        <p:nvSpPr>
-          <p:cNvPr id="2" name="Title 1">
+      <p:pic>
+        <p:nvPicPr>
+          <p:cNvPr id="5" name="Picture 4">
             <a:extLst>
               <a:ext uri="{FF2B5EF4-FFF2-40B4-BE49-F238E27FC236}">
-                <a16:creationId xmlns:a16="http://schemas.microsoft.com/office/drawing/2014/main" id="{0585AFDD-15A8-49BD-A991-AC342AB3A002}"/>
+                <a16:creationId xmlns:a16="http://schemas.microsoft.com/office/drawing/2014/main" id="{FA2BE16E-0C9E-4C2F-9CF9-8AB69F3AAB92}"/>
               </a:ext>
             </a:extLst>
           </p:cNvPr>
-          <p:cNvSpPr>
-            <a:spLocks noGrp="1"/>
-          </p:cNvSpPr>
-          <p:nvPr>
-            <p:ph type="title"/>
-          </p:nvPr>
-        </p:nvSpPr>
-        <p:spPr/>
-        <p:txBody>
-          <a:bodyPr/>
-          <a:lstStyle/>
-          <a:p>
-            <a:r>
-              <a:rPr lang="en-US" dirty="0"/>
-              <a:t>Post Mortem</a:t>
-            </a:r>
-          </a:p>
-        </p:txBody>
-      </p:sp>
-      <p:sp>
-        <p:nvSpPr>
-          <p:cNvPr id="3" name="Content Placeholder 2">
+          <p:cNvPicPr>
+            <a:picLocks noChangeAspect="1"/>
+          </p:cNvPicPr>
+          <p:nvPr/>
+        </p:nvPicPr>
+        <p:blipFill>
+          <a:blip r:embed="rId2">
+            <a:extLst>
+              <a:ext uri="{28A0092B-C50C-407E-A947-70E740481C1C}">
+                <a14:useLocalDpi xmlns:a14="http://schemas.microsoft.com/office/drawing/2010/main" val="0"/>
+              </a:ext>
+            </a:extLst>
+          </a:blip>
+          <a:stretch>
+            <a:fillRect/>
+          </a:stretch>
+        </p:blipFill>
+        <p:spPr>
+          <a:xfrm>
+            <a:off x="6518812" y="61845"/>
+            <a:ext cx="5302112" cy="3534741"/>
+          </a:xfrm>
+          <a:prstGeom prst="rect">
+            <a:avLst/>
+          </a:prstGeom>
+        </p:spPr>
+      </p:pic>
+      <p:pic>
+        <p:nvPicPr>
+          <p:cNvPr id="9" name="Picture 8">
             <a:extLst>
               <a:ext uri="{FF2B5EF4-FFF2-40B4-BE49-F238E27FC236}">
-                <a16:creationId xmlns:a16="http://schemas.microsoft.com/office/drawing/2014/main" id="{30C4F1C1-804B-4A2E-836E-DCB09E48F49D}"/>
+                <a16:creationId xmlns:a16="http://schemas.microsoft.com/office/drawing/2014/main" id="{9FDF30A0-0B71-457A-B7EC-4B4E7CC48151}"/>
               </a:ext>
             </a:extLst>
           </p:cNvPr>
-          <p:cNvSpPr>
-            <a:spLocks noGrp="1"/>
-          </p:cNvSpPr>
-          <p:nvPr>
-            <p:ph idx="1"/>
-          </p:nvPr>
-        </p:nvSpPr>
-        <p:spPr/>
-        <p:txBody>
-          <a:bodyPr/>
-          <a:lstStyle/>
-          <a:p>
-            <a:br>
-              <a:rPr lang="en-US" dirty="0"/>
-            </a:br>
-            <a:r>
-              <a:rPr lang="en-US" dirty="0"/>
-              <a:t>  * Discuss any difficulties that arose, and how you dealt with them</a:t>
-            </a:r>
-            <a:br>
-              <a:rPr lang="en-US" dirty="0"/>
-            </a:br>
-            <a:r>
-              <a:rPr lang="en-US" dirty="0"/>
-              <a:t>  * Discuss any additional questions that came up, but which you didn't have time to answer: What would you research next, if you had two more weeks?</a:t>
-            </a:r>
-            <a:br>
-              <a:rPr lang="en-US" dirty="0"/>
-            </a:br>
-            <a:endParaRPr lang="en-US" dirty="0"/>
-          </a:p>
-          <a:p>
-            <a:endParaRPr lang="en-US" dirty="0"/>
-          </a:p>
-        </p:txBody>
-      </p:sp>
+          <p:cNvPicPr>
+            <a:picLocks noChangeAspect="1"/>
+          </p:cNvPicPr>
+          <p:nvPr/>
+        </p:nvPicPr>
+        <p:blipFill>
+          <a:blip r:embed="rId3">
+            <a:extLst>
+              <a:ext uri="{28A0092B-C50C-407E-A947-70E740481C1C}">
+                <a14:useLocalDpi xmlns:a14="http://schemas.microsoft.com/office/drawing/2010/main" val="0"/>
+              </a:ext>
+            </a:extLst>
+          </a:blip>
+          <a:stretch>
+            <a:fillRect/>
+          </a:stretch>
+        </p:blipFill>
+        <p:spPr>
+          <a:xfrm>
+            <a:off x="371076" y="78310"/>
+            <a:ext cx="5302112" cy="3534741"/>
+          </a:xfrm>
+          <a:prstGeom prst="rect">
+            <a:avLst/>
+          </a:prstGeom>
+        </p:spPr>
+      </p:pic>
+      <p:pic>
+        <p:nvPicPr>
+          <p:cNvPr id="11" name="Picture 10">
+            <a:extLst>
+              <a:ext uri="{FF2B5EF4-FFF2-40B4-BE49-F238E27FC236}">
+                <a16:creationId xmlns:a16="http://schemas.microsoft.com/office/drawing/2014/main" id="{368FABBF-DA05-4483-829E-9F16A47353F3}"/>
+              </a:ext>
+            </a:extLst>
+          </p:cNvPr>
+          <p:cNvPicPr>
+            <a:picLocks noChangeAspect="1"/>
+          </p:cNvPicPr>
+          <p:nvPr/>
+        </p:nvPicPr>
+        <p:blipFill>
+          <a:blip r:embed="rId4">
+            <a:extLst>
+              <a:ext uri="{28A0092B-C50C-407E-A947-70E740481C1C}">
+                <a14:useLocalDpi xmlns:a14="http://schemas.microsoft.com/office/drawing/2010/main" val="0"/>
+              </a:ext>
+            </a:extLst>
+          </a:blip>
+          <a:stretch>
+            <a:fillRect/>
+          </a:stretch>
+        </p:blipFill>
+        <p:spPr>
+          <a:xfrm>
+            <a:off x="0" y="3591012"/>
+            <a:ext cx="12192000" cy="3048000"/>
+          </a:xfrm>
+          <a:prstGeom prst="rect">
+            <a:avLst/>
+          </a:prstGeom>
+        </p:spPr>
+      </p:pic>
     </p:spTree>
     <p:extLst>
       <p:ext uri="{BB962C8B-B14F-4D97-AF65-F5344CB8AC3E}">
-        <p14:creationId xmlns:p14="http://schemas.microsoft.com/office/powerpoint/2010/main" val="2452138939"/>
+        <p14:creationId xmlns:p14="http://schemas.microsoft.com/office/powerpoint/2010/main" val="3132460201"/>
       </p:ext>
     </p:extLst>
   </p:cSld>
@@ -5246,6 +5649,108 @@
           <a:chExt cx="0" cy="0"/>
         </a:xfrm>
       </p:grpSpPr>
+      <p:pic>
+        <p:nvPicPr>
+          <p:cNvPr id="3" name="Picture 2">
+            <a:extLst>
+              <a:ext uri="{FF2B5EF4-FFF2-40B4-BE49-F238E27FC236}">
+                <a16:creationId xmlns:a16="http://schemas.microsoft.com/office/drawing/2014/main" id="{82283535-D72F-48EF-87DE-CD682D3C09D6}"/>
+              </a:ext>
+            </a:extLst>
+          </p:cNvPr>
+          <p:cNvPicPr>
+            <a:picLocks noChangeAspect="1"/>
+          </p:cNvPicPr>
+          <p:nvPr/>
+        </p:nvPicPr>
+        <p:blipFill>
+          <a:blip r:embed="rId2">
+            <a:extLst>
+              <a:ext uri="{28A0092B-C50C-407E-A947-70E740481C1C}">
+                <a14:useLocalDpi xmlns:a14="http://schemas.microsoft.com/office/drawing/2010/main" val="0"/>
+              </a:ext>
+            </a:extLst>
+          </a:blip>
+          <a:stretch>
+            <a:fillRect/>
+          </a:stretch>
+        </p:blipFill>
+        <p:spPr>
+          <a:xfrm>
+            <a:off x="295422" y="1237957"/>
+            <a:ext cx="5487650" cy="3658433"/>
+          </a:xfrm>
+          <a:prstGeom prst="rect">
+            <a:avLst/>
+          </a:prstGeom>
+        </p:spPr>
+      </p:pic>
+      <p:pic>
+        <p:nvPicPr>
+          <p:cNvPr id="5" name="Picture 4">
+            <a:extLst>
+              <a:ext uri="{FF2B5EF4-FFF2-40B4-BE49-F238E27FC236}">
+                <a16:creationId xmlns:a16="http://schemas.microsoft.com/office/drawing/2014/main" id="{C7B93238-0630-4085-8B20-F2A420756893}"/>
+              </a:ext>
+            </a:extLst>
+          </p:cNvPr>
+          <p:cNvPicPr>
+            <a:picLocks noChangeAspect="1"/>
+          </p:cNvPicPr>
+          <p:nvPr/>
+        </p:nvPicPr>
+        <p:blipFill>
+          <a:blip r:embed="rId3">
+            <a:extLst>
+              <a:ext uri="{28A0092B-C50C-407E-A947-70E740481C1C}">
+                <a14:useLocalDpi xmlns:a14="http://schemas.microsoft.com/office/drawing/2010/main" val="0"/>
+              </a:ext>
+            </a:extLst>
+          </a:blip>
+          <a:stretch>
+            <a:fillRect/>
+          </a:stretch>
+        </p:blipFill>
+        <p:spPr>
+          <a:xfrm>
+            <a:off x="6549605" y="1237957"/>
+            <a:ext cx="5487650" cy="3658433"/>
+          </a:xfrm>
+          <a:prstGeom prst="rect">
+            <a:avLst/>
+          </a:prstGeom>
+        </p:spPr>
+      </p:pic>
+    </p:spTree>
+    <p:extLst>
+      <p:ext uri="{BB962C8B-B14F-4D97-AF65-F5344CB8AC3E}">
+        <p14:creationId xmlns:p14="http://schemas.microsoft.com/office/powerpoint/2010/main" val="377206099"/>
+      </p:ext>
+    </p:extLst>
+  </p:cSld>
+  <p:clrMapOvr>
+    <a:masterClrMapping/>
+  </p:clrMapOvr>
+</p:sld>
+</file>
+
+<file path=ppt/slides/slide9.xml><?xml version="1.0" encoding="utf-8"?>
+<p:sld xmlns:a="http://schemas.openxmlformats.org/drawingml/2006/main" xmlns:r="http://schemas.openxmlformats.org/officeDocument/2006/relationships" xmlns:p="http://schemas.openxmlformats.org/presentationml/2006/main">
+  <p:cSld>
+    <p:spTree>
+      <p:nvGrpSpPr>
+        <p:cNvPr id="1" name=""/>
+        <p:cNvGrpSpPr/>
+        <p:nvPr/>
+      </p:nvGrpSpPr>
+      <p:grpSpPr>
+        <a:xfrm>
+          <a:off x="0" y="0"/>
+          <a:ext cx="0" cy="0"/>
+          <a:chOff x="0" y="0"/>
+          <a:chExt cx="0" cy="0"/>
+        </a:xfrm>
+      </p:grpSpPr>
       <p:sp>
         <p:nvSpPr>
           <p:cNvPr id="2" name="Title 1">
@@ -5269,7 +5774,7 @@
           <a:p>
             <a:r>
               <a:rPr lang="en-US" dirty="0"/>
-              <a:t>Questions</a:t>
+              <a:t>Discussion</a:t>
             </a:r>
           </a:p>
         </p:txBody>
@@ -5297,7 +5802,7 @@
           <a:p>
             <a:r>
               <a:rPr lang="en-US" dirty="0"/>
-              <a:t>  * Open-floor Q&amp;A with the audience</a:t>
+              <a:t>  * Discuss your findings. Did you find what you expected to find? If not, why not? What inferences or general conclusions can you draw from your analysis?</a:t>
             </a:r>
             <a:br>
               <a:rPr lang="en-US" dirty="0"/>
@@ -5309,10 +5814,83 @@
           </a:p>
         </p:txBody>
       </p:sp>
+      <p:pic>
+        <p:nvPicPr>
+          <p:cNvPr id="5" name="Picture 4">
+            <a:extLst>
+              <a:ext uri="{FF2B5EF4-FFF2-40B4-BE49-F238E27FC236}">
+                <a16:creationId xmlns:a16="http://schemas.microsoft.com/office/drawing/2014/main" id="{E8950D5B-5870-46C6-9AB5-37D1E307E47A}"/>
+              </a:ext>
+            </a:extLst>
+          </p:cNvPr>
+          <p:cNvPicPr>
+            <a:picLocks noChangeAspect="1"/>
+          </p:cNvPicPr>
+          <p:nvPr/>
+        </p:nvPicPr>
+        <p:blipFill>
+          <a:blip r:embed="rId2">
+            <a:extLst>
+              <a:ext uri="{28A0092B-C50C-407E-A947-70E740481C1C}">
+                <a14:useLocalDpi xmlns:a14="http://schemas.microsoft.com/office/drawing/2010/main" val="0"/>
+              </a:ext>
+            </a:extLst>
+          </a:blip>
+          <a:stretch>
+            <a:fillRect/>
+          </a:stretch>
+        </p:blipFill>
+        <p:spPr>
+          <a:xfrm>
+            <a:off x="2944212" y="2471979"/>
+            <a:ext cx="5487650" cy="3658433"/>
+          </a:xfrm>
+          <a:prstGeom prst="rect">
+            <a:avLst/>
+          </a:prstGeom>
+        </p:spPr>
+      </p:pic>
+      <p:sp>
+        <p:nvSpPr>
+          <p:cNvPr id="6" name="TextBox 5">
+            <a:extLst>
+              <a:ext uri="{FF2B5EF4-FFF2-40B4-BE49-F238E27FC236}">
+                <a16:creationId xmlns:a16="http://schemas.microsoft.com/office/drawing/2014/main" id="{37A9B5EC-F185-4FDB-95B1-54F303A6BC2C}"/>
+              </a:ext>
+            </a:extLst>
+          </p:cNvPr>
+          <p:cNvSpPr txBox="1"/>
+          <p:nvPr/>
+        </p:nvSpPr>
+        <p:spPr>
+          <a:xfrm>
+            <a:off x="6970032" y="3833665"/>
+            <a:ext cx="2425147" cy="923330"/>
+          </a:xfrm>
+          <a:prstGeom prst="rect">
+            <a:avLst/>
+          </a:prstGeom>
+          <a:solidFill>
+            <a:srgbClr val="FF0000"/>
+          </a:solidFill>
+        </p:spPr>
+        <p:txBody>
+          <a:bodyPr wrap="square" rtlCol="0">
+            <a:spAutoFit/>
+          </a:bodyPr>
+          <a:lstStyle/>
+          <a:p>
+            <a:r>
+              <a:rPr lang="en-US" dirty="0"/>
+              <a:t>Fix graph to explain y axis (thousands? Millions? for both)</a:t>
+            </a:r>
+          </a:p>
+        </p:txBody>
+      </p:sp>
     </p:spTree>
     <p:extLst>
       <p:ext uri="{BB962C8B-B14F-4D97-AF65-F5344CB8AC3E}">
-        <p14:creationId xmlns:p14="http://schemas.microsoft.com/office/powerpoint/2010/main" val="3314395609"/>
+        <p14:creationId xmlns:p14="http://schemas.microsoft.com/office/powerpoint/2010/main" val="1047368940"/>
       </p:ext>
     </p:extLst>
   </p:cSld>

</xml_diff>